<commit_message>
Minor part 1 updates
</commit_message>
<xml_diff>
--- a/docs/screenshots/ScheduleScreenshots.pptx
+++ b/docs/screenshots/ScheduleScreenshots.pptx
@@ -6,6 +6,8 @@
   </p:sldMasterIdLst>
   <p:sldIdLst>
     <p:sldId id="256" r:id="rId2"/>
+    <p:sldId id="257" r:id="rId3"/>
+    <p:sldId id="258" r:id="rId4"/>
   </p:sldIdLst>
   <p:sldSz cx="12192000" cy="6858000"/>
   <p:notesSz cx="6858000" cy="9144000"/>
@@ -259,7 +261,7 @@
           <a:p>
             <a:fld id="{558F4BAB-A7F6-40F6-A2B5-3EFC4A4C126F}" type="datetimeFigureOut">
               <a:rPr lang="en-US" smtClean="0"/>
-              <a:t>12-Apr-18</a:t>
+              <a:t>4/13/2018</a:t>
             </a:fld>
             <a:endParaRPr lang="en-US"/>
           </a:p>
@@ -457,7 +459,7 @@
           <a:p>
             <a:fld id="{558F4BAB-A7F6-40F6-A2B5-3EFC4A4C126F}" type="datetimeFigureOut">
               <a:rPr lang="en-US" smtClean="0"/>
-              <a:t>12-Apr-18</a:t>
+              <a:t>4/13/2018</a:t>
             </a:fld>
             <a:endParaRPr lang="en-US"/>
           </a:p>
@@ -665,7 +667,7 @@
           <a:p>
             <a:fld id="{558F4BAB-A7F6-40F6-A2B5-3EFC4A4C126F}" type="datetimeFigureOut">
               <a:rPr lang="en-US" smtClean="0"/>
-              <a:t>12-Apr-18</a:t>
+              <a:t>4/13/2018</a:t>
             </a:fld>
             <a:endParaRPr lang="en-US"/>
           </a:p>
@@ -863,7 +865,7 @@
           <a:p>
             <a:fld id="{558F4BAB-A7F6-40F6-A2B5-3EFC4A4C126F}" type="datetimeFigureOut">
               <a:rPr lang="en-US" smtClean="0"/>
-              <a:t>12-Apr-18</a:t>
+              <a:t>4/13/2018</a:t>
             </a:fld>
             <a:endParaRPr lang="en-US"/>
           </a:p>
@@ -1138,7 +1140,7 @@
           <a:p>
             <a:fld id="{558F4BAB-A7F6-40F6-A2B5-3EFC4A4C126F}" type="datetimeFigureOut">
               <a:rPr lang="en-US" smtClean="0"/>
-              <a:t>12-Apr-18</a:t>
+              <a:t>4/13/2018</a:t>
             </a:fld>
             <a:endParaRPr lang="en-US"/>
           </a:p>
@@ -1403,7 +1405,7 @@
           <a:p>
             <a:fld id="{558F4BAB-A7F6-40F6-A2B5-3EFC4A4C126F}" type="datetimeFigureOut">
               <a:rPr lang="en-US" smtClean="0"/>
-              <a:t>12-Apr-18</a:t>
+              <a:t>4/13/2018</a:t>
             </a:fld>
             <a:endParaRPr lang="en-US"/>
           </a:p>
@@ -1815,7 +1817,7 @@
           <a:p>
             <a:fld id="{558F4BAB-A7F6-40F6-A2B5-3EFC4A4C126F}" type="datetimeFigureOut">
               <a:rPr lang="en-US" smtClean="0"/>
-              <a:t>12-Apr-18</a:t>
+              <a:t>4/13/2018</a:t>
             </a:fld>
             <a:endParaRPr lang="en-US"/>
           </a:p>
@@ -1956,7 +1958,7 @@
           <a:p>
             <a:fld id="{558F4BAB-A7F6-40F6-A2B5-3EFC4A4C126F}" type="datetimeFigureOut">
               <a:rPr lang="en-US" smtClean="0"/>
-              <a:t>12-Apr-18</a:t>
+              <a:t>4/13/2018</a:t>
             </a:fld>
             <a:endParaRPr lang="en-US"/>
           </a:p>
@@ -2069,7 +2071,7 @@
           <a:p>
             <a:fld id="{558F4BAB-A7F6-40F6-A2B5-3EFC4A4C126F}" type="datetimeFigureOut">
               <a:rPr lang="en-US" smtClean="0"/>
-              <a:t>12-Apr-18</a:t>
+              <a:t>4/13/2018</a:t>
             </a:fld>
             <a:endParaRPr lang="en-US"/>
           </a:p>
@@ -2380,7 +2382,7 @@
           <a:p>
             <a:fld id="{558F4BAB-A7F6-40F6-A2B5-3EFC4A4C126F}" type="datetimeFigureOut">
               <a:rPr lang="en-US" smtClean="0"/>
-              <a:t>12-Apr-18</a:t>
+              <a:t>4/13/2018</a:t>
             </a:fld>
             <a:endParaRPr lang="en-US"/>
           </a:p>
@@ -2668,7 +2670,7 @@
           <a:p>
             <a:fld id="{558F4BAB-A7F6-40F6-A2B5-3EFC4A4C126F}" type="datetimeFigureOut">
               <a:rPr lang="en-US" smtClean="0"/>
-              <a:t>12-Apr-18</a:t>
+              <a:t>4/13/2018</a:t>
             </a:fld>
             <a:endParaRPr lang="en-US"/>
           </a:p>
@@ -2909,7 +2911,7 @@
           <a:p>
             <a:fld id="{558F4BAB-A7F6-40F6-A2B5-3EFC4A4C126F}" type="datetimeFigureOut">
               <a:rPr lang="en-US" smtClean="0"/>
-              <a:t>12-Apr-18</a:t>
+              <a:t>4/13/2018</a:t>
             </a:fld>
             <a:endParaRPr lang="en-US"/>
           </a:p>
@@ -3784,6 +3786,1817 @@
 </p:sld>
 </file>
 
+<file path=ppt/slides/slide2.xml><?xml version="1.0" encoding="utf-8"?>
+<p:sld xmlns:a="http://schemas.openxmlformats.org/drawingml/2006/main" xmlns:r="http://schemas.openxmlformats.org/officeDocument/2006/relationships" xmlns:p="http://schemas.openxmlformats.org/presentationml/2006/main">
+  <p:cSld>
+    <p:spTree>
+      <p:nvGrpSpPr>
+        <p:cNvPr id="1" name=""/>
+        <p:cNvGrpSpPr/>
+        <p:nvPr/>
+      </p:nvGrpSpPr>
+      <p:grpSpPr>
+        <a:xfrm>
+          <a:off x="0" y="0"/>
+          <a:ext cx="0" cy="0"/>
+          <a:chOff x="0" y="0"/>
+          <a:chExt cx="0" cy="0"/>
+        </a:xfrm>
+      </p:grpSpPr>
+      <p:pic>
+        <p:nvPicPr>
+          <p:cNvPr id="15" name="Picture 14"/>
+          <p:cNvPicPr>
+            <a:picLocks noChangeAspect="1"/>
+          </p:cNvPicPr>
+          <p:nvPr/>
+        </p:nvPicPr>
+        <p:blipFill>
+          <a:blip r:embed="rId2"/>
+          <a:stretch>
+            <a:fillRect/>
+          </a:stretch>
+        </p:blipFill>
+        <p:spPr>
+          <a:xfrm>
+            <a:off x="2534559" y="597852"/>
+            <a:ext cx="9582626" cy="5913442"/>
+          </a:xfrm>
+          <a:prstGeom prst="rect">
+            <a:avLst/>
+          </a:prstGeom>
+        </p:spPr>
+      </p:pic>
+      <p:sp>
+        <p:nvSpPr>
+          <p:cNvPr id="3" name="Rectangle: Rounded Corners 8">
+            <a:extLst>
+              <a:ext uri="{FF2B5EF4-FFF2-40B4-BE49-F238E27FC236}">
+                <a16:creationId xmlns:a16="http://schemas.microsoft.com/office/drawing/2014/main" id="{B447E29A-1E5C-4328-A4B3-F679E1A80022}"/>
+              </a:ext>
+            </a:extLst>
+          </p:cNvPr>
+          <p:cNvSpPr/>
+          <p:nvPr/>
+        </p:nvSpPr>
+        <p:spPr>
+          <a:xfrm>
+            <a:off x="2566511" y="1022204"/>
+            <a:ext cx="9165123" cy="363626"/>
+          </a:xfrm>
+          <a:prstGeom prst="roundRect">
+            <a:avLst/>
+          </a:prstGeom>
+          <a:noFill/>
+          <a:ln w="38100">
+            <a:solidFill>
+              <a:srgbClr val="DECE64"/>
+            </a:solidFill>
+          </a:ln>
+        </p:spPr>
+        <p:style>
+          <a:lnRef idx="2">
+            <a:schemeClr val="accent6"/>
+          </a:lnRef>
+          <a:fillRef idx="1">
+            <a:schemeClr val="lt1"/>
+          </a:fillRef>
+          <a:effectRef idx="0">
+            <a:schemeClr val="accent6"/>
+          </a:effectRef>
+          <a:fontRef idx="minor">
+            <a:schemeClr val="dk1"/>
+          </a:fontRef>
+        </p:style>
+        <p:txBody>
+          <a:bodyPr rtlCol="0" anchor="ctr"/>
+          <a:lstStyle>
+            <a:defPPr>
+              <a:defRPr lang="en-US"/>
+            </a:defPPr>
+            <a:lvl1pPr marL="0" algn="l" defTabSz="914400" rtl="0" eaLnBrk="1" latinLnBrk="0" hangingPunct="1">
+              <a:defRPr sz="1800" kern="1200">
+                <a:solidFill>
+                  <a:schemeClr val="dk1"/>
+                </a:solidFill>
+                <a:latin typeface="+mn-lt"/>
+                <a:ea typeface="+mn-ea"/>
+                <a:cs typeface="+mn-cs"/>
+              </a:defRPr>
+            </a:lvl1pPr>
+            <a:lvl2pPr marL="457200" algn="l" defTabSz="914400" rtl="0" eaLnBrk="1" latinLnBrk="0" hangingPunct="1">
+              <a:defRPr sz="1800" kern="1200">
+                <a:solidFill>
+                  <a:schemeClr val="dk1"/>
+                </a:solidFill>
+                <a:latin typeface="+mn-lt"/>
+                <a:ea typeface="+mn-ea"/>
+                <a:cs typeface="+mn-cs"/>
+              </a:defRPr>
+            </a:lvl2pPr>
+            <a:lvl3pPr marL="914400" algn="l" defTabSz="914400" rtl="0" eaLnBrk="1" latinLnBrk="0" hangingPunct="1">
+              <a:defRPr sz="1800" kern="1200">
+                <a:solidFill>
+                  <a:schemeClr val="dk1"/>
+                </a:solidFill>
+                <a:latin typeface="+mn-lt"/>
+                <a:ea typeface="+mn-ea"/>
+                <a:cs typeface="+mn-cs"/>
+              </a:defRPr>
+            </a:lvl3pPr>
+            <a:lvl4pPr marL="1371600" algn="l" defTabSz="914400" rtl="0" eaLnBrk="1" latinLnBrk="0" hangingPunct="1">
+              <a:defRPr sz="1800" kern="1200">
+                <a:solidFill>
+                  <a:schemeClr val="dk1"/>
+                </a:solidFill>
+                <a:latin typeface="+mn-lt"/>
+                <a:ea typeface="+mn-ea"/>
+                <a:cs typeface="+mn-cs"/>
+              </a:defRPr>
+            </a:lvl4pPr>
+            <a:lvl5pPr marL="1828800" algn="l" defTabSz="914400" rtl="0" eaLnBrk="1" latinLnBrk="0" hangingPunct="1">
+              <a:defRPr sz="1800" kern="1200">
+                <a:solidFill>
+                  <a:schemeClr val="dk1"/>
+                </a:solidFill>
+                <a:latin typeface="+mn-lt"/>
+                <a:ea typeface="+mn-ea"/>
+                <a:cs typeface="+mn-cs"/>
+              </a:defRPr>
+            </a:lvl5pPr>
+            <a:lvl6pPr marL="2286000" algn="l" defTabSz="914400" rtl="0" eaLnBrk="1" latinLnBrk="0" hangingPunct="1">
+              <a:defRPr sz="1800" kern="1200">
+                <a:solidFill>
+                  <a:schemeClr val="dk1"/>
+                </a:solidFill>
+                <a:latin typeface="+mn-lt"/>
+                <a:ea typeface="+mn-ea"/>
+                <a:cs typeface="+mn-cs"/>
+              </a:defRPr>
+            </a:lvl6pPr>
+            <a:lvl7pPr marL="2743200" algn="l" defTabSz="914400" rtl="0" eaLnBrk="1" latinLnBrk="0" hangingPunct="1">
+              <a:defRPr sz="1800" kern="1200">
+                <a:solidFill>
+                  <a:schemeClr val="dk1"/>
+                </a:solidFill>
+                <a:latin typeface="+mn-lt"/>
+                <a:ea typeface="+mn-ea"/>
+                <a:cs typeface="+mn-cs"/>
+              </a:defRPr>
+            </a:lvl7pPr>
+            <a:lvl8pPr marL="3200400" algn="l" defTabSz="914400" rtl="0" eaLnBrk="1" latinLnBrk="0" hangingPunct="1">
+              <a:defRPr sz="1800" kern="1200">
+                <a:solidFill>
+                  <a:schemeClr val="dk1"/>
+                </a:solidFill>
+                <a:latin typeface="+mn-lt"/>
+                <a:ea typeface="+mn-ea"/>
+                <a:cs typeface="+mn-cs"/>
+              </a:defRPr>
+            </a:lvl8pPr>
+            <a:lvl9pPr marL="3657600" algn="l" defTabSz="914400" rtl="0" eaLnBrk="1" latinLnBrk="0" hangingPunct="1">
+              <a:defRPr sz="1800" kern="1200">
+                <a:solidFill>
+                  <a:schemeClr val="dk1"/>
+                </a:solidFill>
+                <a:latin typeface="+mn-lt"/>
+                <a:ea typeface="+mn-ea"/>
+                <a:cs typeface="+mn-cs"/>
+              </a:defRPr>
+            </a:lvl9pPr>
+          </a:lstStyle>
+          <a:p>
+            <a:pPr algn="ctr"/>
+            <a:endParaRPr lang="en-US" baseline="-25000" dirty="0"/>
+          </a:p>
+        </p:txBody>
+      </p:sp>
+      <p:cxnSp>
+        <p:nvCxnSpPr>
+          <p:cNvPr id="4" name="Straight Connector 3">
+            <a:extLst>
+              <a:ext uri="{FF2B5EF4-FFF2-40B4-BE49-F238E27FC236}">
+                <a16:creationId xmlns:a16="http://schemas.microsoft.com/office/drawing/2014/main" id="{F3E27EC6-F751-4B53-B8E2-35D54A66CDA6}"/>
+              </a:ext>
+            </a:extLst>
+          </p:cNvPr>
+          <p:cNvCxnSpPr>
+            <a:cxnSpLocks/>
+            <a:stCxn id="3" idx="1"/>
+            <a:endCxn id="5" idx="3"/>
+          </p:cNvCxnSpPr>
+          <p:nvPr/>
+        </p:nvCxnSpPr>
+        <p:spPr>
+          <a:xfrm flipH="1" flipV="1">
+            <a:off x="1704110" y="1040797"/>
+            <a:ext cx="862401" cy="163220"/>
+          </a:xfrm>
+          <a:prstGeom prst="line">
+            <a:avLst/>
+          </a:prstGeom>
+          <a:ln w="38100">
+            <a:solidFill>
+              <a:srgbClr val="DECE64"/>
+            </a:solidFill>
+          </a:ln>
+        </p:spPr>
+        <p:style>
+          <a:lnRef idx="1">
+            <a:schemeClr val="accent1"/>
+          </a:lnRef>
+          <a:fillRef idx="0">
+            <a:schemeClr val="accent1"/>
+          </a:fillRef>
+          <a:effectRef idx="0">
+            <a:schemeClr val="accent1"/>
+          </a:effectRef>
+          <a:fontRef idx="minor">
+            <a:schemeClr val="tx1"/>
+          </a:fontRef>
+        </p:style>
+      </p:cxnSp>
+      <p:sp>
+        <p:nvSpPr>
+          <p:cNvPr id="5" name="TextBox 11">
+            <a:extLst>
+              <a:ext uri="{FF2B5EF4-FFF2-40B4-BE49-F238E27FC236}">
+                <a16:creationId xmlns:a16="http://schemas.microsoft.com/office/drawing/2014/main" id="{0DC88B0A-A26D-4C97-8D65-F9EAF98C73E2}"/>
+              </a:ext>
+            </a:extLst>
+          </p:cNvPr>
+          <p:cNvSpPr txBox="1"/>
+          <p:nvPr/>
+        </p:nvSpPr>
+        <p:spPr>
+          <a:xfrm>
+            <a:off x="0" y="748409"/>
+            <a:ext cx="1704110" cy="584775"/>
+          </a:xfrm>
+          <a:prstGeom prst="rect">
+            <a:avLst/>
+          </a:prstGeom>
+          <a:solidFill>
+            <a:srgbClr val="DECE64"/>
+          </a:solidFill>
+        </p:spPr>
+        <p:txBody>
+          <a:bodyPr wrap="square" rtlCol="0">
+            <a:spAutoFit/>
+          </a:bodyPr>
+          <a:lstStyle>
+            <a:defPPr>
+              <a:defRPr lang="en-US"/>
+            </a:defPPr>
+            <a:lvl1pPr marL="0" algn="l" defTabSz="914400" rtl="0" eaLnBrk="1" latinLnBrk="0" hangingPunct="1">
+              <a:defRPr sz="1800" kern="1200">
+                <a:solidFill>
+                  <a:schemeClr val="tx1"/>
+                </a:solidFill>
+                <a:latin typeface="+mn-lt"/>
+                <a:ea typeface="+mn-ea"/>
+                <a:cs typeface="+mn-cs"/>
+              </a:defRPr>
+            </a:lvl1pPr>
+            <a:lvl2pPr marL="457200" algn="l" defTabSz="914400" rtl="0" eaLnBrk="1" latinLnBrk="0" hangingPunct="1">
+              <a:defRPr sz="1800" kern="1200">
+                <a:solidFill>
+                  <a:schemeClr val="tx1"/>
+                </a:solidFill>
+                <a:latin typeface="+mn-lt"/>
+                <a:ea typeface="+mn-ea"/>
+                <a:cs typeface="+mn-cs"/>
+              </a:defRPr>
+            </a:lvl2pPr>
+            <a:lvl3pPr marL="914400" algn="l" defTabSz="914400" rtl="0" eaLnBrk="1" latinLnBrk="0" hangingPunct="1">
+              <a:defRPr sz="1800" kern="1200">
+                <a:solidFill>
+                  <a:schemeClr val="tx1"/>
+                </a:solidFill>
+                <a:latin typeface="+mn-lt"/>
+                <a:ea typeface="+mn-ea"/>
+                <a:cs typeface="+mn-cs"/>
+              </a:defRPr>
+            </a:lvl3pPr>
+            <a:lvl4pPr marL="1371600" algn="l" defTabSz="914400" rtl="0" eaLnBrk="1" latinLnBrk="0" hangingPunct="1">
+              <a:defRPr sz="1800" kern="1200">
+                <a:solidFill>
+                  <a:schemeClr val="tx1"/>
+                </a:solidFill>
+                <a:latin typeface="+mn-lt"/>
+                <a:ea typeface="+mn-ea"/>
+                <a:cs typeface="+mn-cs"/>
+              </a:defRPr>
+            </a:lvl4pPr>
+            <a:lvl5pPr marL="1828800" algn="l" defTabSz="914400" rtl="0" eaLnBrk="1" latinLnBrk="0" hangingPunct="1">
+              <a:defRPr sz="1800" kern="1200">
+                <a:solidFill>
+                  <a:schemeClr val="tx1"/>
+                </a:solidFill>
+                <a:latin typeface="+mn-lt"/>
+                <a:ea typeface="+mn-ea"/>
+                <a:cs typeface="+mn-cs"/>
+              </a:defRPr>
+            </a:lvl5pPr>
+            <a:lvl6pPr marL="2286000" algn="l" defTabSz="914400" rtl="0" eaLnBrk="1" latinLnBrk="0" hangingPunct="1">
+              <a:defRPr sz="1800" kern="1200">
+                <a:solidFill>
+                  <a:schemeClr val="tx1"/>
+                </a:solidFill>
+                <a:latin typeface="+mn-lt"/>
+                <a:ea typeface="+mn-ea"/>
+                <a:cs typeface="+mn-cs"/>
+              </a:defRPr>
+            </a:lvl6pPr>
+            <a:lvl7pPr marL="2743200" algn="l" defTabSz="914400" rtl="0" eaLnBrk="1" latinLnBrk="0" hangingPunct="1">
+              <a:defRPr sz="1800" kern="1200">
+                <a:solidFill>
+                  <a:schemeClr val="tx1"/>
+                </a:solidFill>
+                <a:latin typeface="+mn-lt"/>
+                <a:ea typeface="+mn-ea"/>
+                <a:cs typeface="+mn-cs"/>
+              </a:defRPr>
+            </a:lvl7pPr>
+            <a:lvl8pPr marL="3200400" algn="l" defTabSz="914400" rtl="0" eaLnBrk="1" latinLnBrk="0" hangingPunct="1">
+              <a:defRPr sz="1800" kern="1200">
+                <a:solidFill>
+                  <a:schemeClr val="tx1"/>
+                </a:solidFill>
+                <a:latin typeface="+mn-lt"/>
+                <a:ea typeface="+mn-ea"/>
+                <a:cs typeface="+mn-cs"/>
+              </a:defRPr>
+            </a:lvl8pPr>
+            <a:lvl9pPr marL="3657600" algn="l" defTabSz="914400" rtl="0" eaLnBrk="1" latinLnBrk="0" hangingPunct="1">
+              <a:defRPr sz="1800" kern="1200">
+                <a:solidFill>
+                  <a:schemeClr val="tx1"/>
+                </a:solidFill>
+                <a:latin typeface="+mn-lt"/>
+                <a:ea typeface="+mn-ea"/>
+                <a:cs typeface="+mn-cs"/>
+              </a:defRPr>
+            </a:lvl9pPr>
+          </a:lstStyle>
+          <a:p>
+            <a:r>
+              <a:rPr lang="en-US" sz="1600" dirty="0" smtClean="0">
+                <a:solidFill>
+                  <a:schemeClr val="bg1"/>
+                </a:solidFill>
+                <a:latin typeface="Montserrat SemiBold" panose="00000700000000000000" pitchFamily="2" charset="0"/>
+              </a:rPr>
+              <a:t>1. Command Box</a:t>
+            </a:r>
+            <a:endParaRPr lang="en-US" sz="1600" dirty="0">
+              <a:solidFill>
+                <a:schemeClr val="bg1"/>
+              </a:solidFill>
+              <a:latin typeface="Montserrat SemiBold" panose="00000700000000000000" pitchFamily="2" charset="0"/>
+            </a:endParaRPr>
+          </a:p>
+        </p:txBody>
+      </p:sp>
+      <p:sp>
+        <p:nvSpPr>
+          <p:cNvPr id="28" name="Rectangle: Rounded Corners 8">
+            <a:extLst>
+              <a:ext uri="{FF2B5EF4-FFF2-40B4-BE49-F238E27FC236}">
+                <a16:creationId xmlns:a16="http://schemas.microsoft.com/office/drawing/2014/main" id="{B447E29A-1E5C-4328-A4B3-F679E1A80022}"/>
+              </a:ext>
+            </a:extLst>
+          </p:cNvPr>
+          <p:cNvSpPr/>
+          <p:nvPr/>
+        </p:nvSpPr>
+        <p:spPr>
+          <a:xfrm>
+            <a:off x="2609374" y="1472278"/>
+            <a:ext cx="9165123" cy="381459"/>
+          </a:xfrm>
+          <a:prstGeom prst="roundRect">
+            <a:avLst/>
+          </a:prstGeom>
+          <a:noFill/>
+          <a:ln w="38100">
+            <a:solidFill>
+              <a:srgbClr val="DECE64"/>
+            </a:solidFill>
+          </a:ln>
+        </p:spPr>
+        <p:style>
+          <a:lnRef idx="2">
+            <a:schemeClr val="accent6"/>
+          </a:lnRef>
+          <a:fillRef idx="1">
+            <a:schemeClr val="lt1"/>
+          </a:fillRef>
+          <a:effectRef idx="0">
+            <a:schemeClr val="accent6"/>
+          </a:effectRef>
+          <a:fontRef idx="minor">
+            <a:schemeClr val="dk1"/>
+          </a:fontRef>
+        </p:style>
+        <p:txBody>
+          <a:bodyPr rtlCol="0" anchor="ctr"/>
+          <a:lstStyle>
+            <a:defPPr>
+              <a:defRPr lang="en-US"/>
+            </a:defPPr>
+            <a:lvl1pPr marL="0" algn="l" defTabSz="914400" rtl="0" eaLnBrk="1" latinLnBrk="0" hangingPunct="1">
+              <a:defRPr sz="1800" kern="1200">
+                <a:solidFill>
+                  <a:schemeClr val="dk1"/>
+                </a:solidFill>
+                <a:latin typeface="+mn-lt"/>
+                <a:ea typeface="+mn-ea"/>
+                <a:cs typeface="+mn-cs"/>
+              </a:defRPr>
+            </a:lvl1pPr>
+            <a:lvl2pPr marL="457200" algn="l" defTabSz="914400" rtl="0" eaLnBrk="1" latinLnBrk="0" hangingPunct="1">
+              <a:defRPr sz="1800" kern="1200">
+                <a:solidFill>
+                  <a:schemeClr val="dk1"/>
+                </a:solidFill>
+                <a:latin typeface="+mn-lt"/>
+                <a:ea typeface="+mn-ea"/>
+                <a:cs typeface="+mn-cs"/>
+              </a:defRPr>
+            </a:lvl2pPr>
+            <a:lvl3pPr marL="914400" algn="l" defTabSz="914400" rtl="0" eaLnBrk="1" latinLnBrk="0" hangingPunct="1">
+              <a:defRPr sz="1800" kern="1200">
+                <a:solidFill>
+                  <a:schemeClr val="dk1"/>
+                </a:solidFill>
+                <a:latin typeface="+mn-lt"/>
+                <a:ea typeface="+mn-ea"/>
+                <a:cs typeface="+mn-cs"/>
+              </a:defRPr>
+            </a:lvl3pPr>
+            <a:lvl4pPr marL="1371600" algn="l" defTabSz="914400" rtl="0" eaLnBrk="1" latinLnBrk="0" hangingPunct="1">
+              <a:defRPr sz="1800" kern="1200">
+                <a:solidFill>
+                  <a:schemeClr val="dk1"/>
+                </a:solidFill>
+                <a:latin typeface="+mn-lt"/>
+                <a:ea typeface="+mn-ea"/>
+                <a:cs typeface="+mn-cs"/>
+              </a:defRPr>
+            </a:lvl4pPr>
+            <a:lvl5pPr marL="1828800" algn="l" defTabSz="914400" rtl="0" eaLnBrk="1" latinLnBrk="0" hangingPunct="1">
+              <a:defRPr sz="1800" kern="1200">
+                <a:solidFill>
+                  <a:schemeClr val="dk1"/>
+                </a:solidFill>
+                <a:latin typeface="+mn-lt"/>
+                <a:ea typeface="+mn-ea"/>
+                <a:cs typeface="+mn-cs"/>
+              </a:defRPr>
+            </a:lvl5pPr>
+            <a:lvl6pPr marL="2286000" algn="l" defTabSz="914400" rtl="0" eaLnBrk="1" latinLnBrk="0" hangingPunct="1">
+              <a:defRPr sz="1800" kern="1200">
+                <a:solidFill>
+                  <a:schemeClr val="dk1"/>
+                </a:solidFill>
+                <a:latin typeface="+mn-lt"/>
+                <a:ea typeface="+mn-ea"/>
+                <a:cs typeface="+mn-cs"/>
+              </a:defRPr>
+            </a:lvl6pPr>
+            <a:lvl7pPr marL="2743200" algn="l" defTabSz="914400" rtl="0" eaLnBrk="1" latinLnBrk="0" hangingPunct="1">
+              <a:defRPr sz="1800" kern="1200">
+                <a:solidFill>
+                  <a:schemeClr val="dk1"/>
+                </a:solidFill>
+                <a:latin typeface="+mn-lt"/>
+                <a:ea typeface="+mn-ea"/>
+                <a:cs typeface="+mn-cs"/>
+              </a:defRPr>
+            </a:lvl7pPr>
+            <a:lvl8pPr marL="3200400" algn="l" defTabSz="914400" rtl="0" eaLnBrk="1" latinLnBrk="0" hangingPunct="1">
+              <a:defRPr sz="1800" kern="1200">
+                <a:solidFill>
+                  <a:schemeClr val="dk1"/>
+                </a:solidFill>
+                <a:latin typeface="+mn-lt"/>
+                <a:ea typeface="+mn-ea"/>
+                <a:cs typeface="+mn-cs"/>
+              </a:defRPr>
+            </a:lvl8pPr>
+            <a:lvl9pPr marL="3657600" algn="l" defTabSz="914400" rtl="0" eaLnBrk="1" latinLnBrk="0" hangingPunct="1">
+              <a:defRPr sz="1800" kern="1200">
+                <a:solidFill>
+                  <a:schemeClr val="dk1"/>
+                </a:solidFill>
+                <a:latin typeface="+mn-lt"/>
+                <a:ea typeface="+mn-ea"/>
+                <a:cs typeface="+mn-cs"/>
+              </a:defRPr>
+            </a:lvl9pPr>
+          </a:lstStyle>
+          <a:p>
+            <a:pPr algn="ctr"/>
+            <a:endParaRPr lang="en-US" baseline="-25000" dirty="0"/>
+          </a:p>
+        </p:txBody>
+      </p:sp>
+      <p:cxnSp>
+        <p:nvCxnSpPr>
+          <p:cNvPr id="29" name="Straight Connector 28">
+            <a:extLst>
+              <a:ext uri="{FF2B5EF4-FFF2-40B4-BE49-F238E27FC236}">
+                <a16:creationId xmlns:a16="http://schemas.microsoft.com/office/drawing/2014/main" id="{F3E27EC6-F751-4B53-B8E2-35D54A66CDA6}"/>
+              </a:ext>
+            </a:extLst>
+          </p:cNvPr>
+          <p:cNvCxnSpPr>
+            <a:cxnSpLocks/>
+            <a:stCxn id="28" idx="1"/>
+            <a:endCxn id="30" idx="3"/>
+          </p:cNvCxnSpPr>
+          <p:nvPr/>
+        </p:nvCxnSpPr>
+        <p:spPr>
+          <a:xfrm flipH="1">
+            <a:off x="1704109" y="1663008"/>
+            <a:ext cx="905265" cy="41158"/>
+          </a:xfrm>
+          <a:prstGeom prst="line">
+            <a:avLst/>
+          </a:prstGeom>
+          <a:ln w="38100">
+            <a:solidFill>
+              <a:srgbClr val="DECE64"/>
+            </a:solidFill>
+          </a:ln>
+        </p:spPr>
+        <p:style>
+          <a:lnRef idx="1">
+            <a:schemeClr val="accent1"/>
+          </a:lnRef>
+          <a:fillRef idx="0">
+            <a:schemeClr val="accent1"/>
+          </a:fillRef>
+          <a:effectRef idx="0">
+            <a:schemeClr val="accent1"/>
+          </a:effectRef>
+          <a:fontRef idx="minor">
+            <a:schemeClr val="tx1"/>
+          </a:fontRef>
+        </p:style>
+      </p:cxnSp>
+      <p:sp>
+        <p:nvSpPr>
+          <p:cNvPr id="30" name="TextBox 11">
+            <a:extLst>
+              <a:ext uri="{FF2B5EF4-FFF2-40B4-BE49-F238E27FC236}">
+                <a16:creationId xmlns:a16="http://schemas.microsoft.com/office/drawing/2014/main" id="{0DC88B0A-A26D-4C97-8D65-F9EAF98C73E2}"/>
+              </a:ext>
+            </a:extLst>
+          </p:cNvPr>
+          <p:cNvSpPr txBox="1"/>
+          <p:nvPr/>
+        </p:nvSpPr>
+        <p:spPr>
+          <a:xfrm>
+            <a:off x="0" y="1411778"/>
+            <a:ext cx="1704109" cy="584775"/>
+          </a:xfrm>
+          <a:prstGeom prst="rect">
+            <a:avLst/>
+          </a:prstGeom>
+          <a:solidFill>
+            <a:srgbClr val="DECE64"/>
+          </a:solidFill>
+        </p:spPr>
+        <p:txBody>
+          <a:bodyPr wrap="square" rtlCol="0">
+            <a:spAutoFit/>
+          </a:bodyPr>
+          <a:lstStyle>
+            <a:defPPr>
+              <a:defRPr lang="en-US"/>
+            </a:defPPr>
+            <a:lvl1pPr marL="0" algn="l" defTabSz="914400" rtl="0" eaLnBrk="1" latinLnBrk="0" hangingPunct="1">
+              <a:defRPr sz="1800" kern="1200">
+                <a:solidFill>
+                  <a:schemeClr val="tx1"/>
+                </a:solidFill>
+                <a:latin typeface="+mn-lt"/>
+                <a:ea typeface="+mn-ea"/>
+                <a:cs typeface="+mn-cs"/>
+              </a:defRPr>
+            </a:lvl1pPr>
+            <a:lvl2pPr marL="457200" algn="l" defTabSz="914400" rtl="0" eaLnBrk="1" latinLnBrk="0" hangingPunct="1">
+              <a:defRPr sz="1800" kern="1200">
+                <a:solidFill>
+                  <a:schemeClr val="tx1"/>
+                </a:solidFill>
+                <a:latin typeface="+mn-lt"/>
+                <a:ea typeface="+mn-ea"/>
+                <a:cs typeface="+mn-cs"/>
+              </a:defRPr>
+            </a:lvl2pPr>
+            <a:lvl3pPr marL="914400" algn="l" defTabSz="914400" rtl="0" eaLnBrk="1" latinLnBrk="0" hangingPunct="1">
+              <a:defRPr sz="1800" kern="1200">
+                <a:solidFill>
+                  <a:schemeClr val="tx1"/>
+                </a:solidFill>
+                <a:latin typeface="+mn-lt"/>
+                <a:ea typeface="+mn-ea"/>
+                <a:cs typeface="+mn-cs"/>
+              </a:defRPr>
+            </a:lvl3pPr>
+            <a:lvl4pPr marL="1371600" algn="l" defTabSz="914400" rtl="0" eaLnBrk="1" latinLnBrk="0" hangingPunct="1">
+              <a:defRPr sz="1800" kern="1200">
+                <a:solidFill>
+                  <a:schemeClr val="tx1"/>
+                </a:solidFill>
+                <a:latin typeface="+mn-lt"/>
+                <a:ea typeface="+mn-ea"/>
+                <a:cs typeface="+mn-cs"/>
+              </a:defRPr>
+            </a:lvl4pPr>
+            <a:lvl5pPr marL="1828800" algn="l" defTabSz="914400" rtl="0" eaLnBrk="1" latinLnBrk="0" hangingPunct="1">
+              <a:defRPr sz="1800" kern="1200">
+                <a:solidFill>
+                  <a:schemeClr val="tx1"/>
+                </a:solidFill>
+                <a:latin typeface="+mn-lt"/>
+                <a:ea typeface="+mn-ea"/>
+                <a:cs typeface="+mn-cs"/>
+              </a:defRPr>
+            </a:lvl5pPr>
+            <a:lvl6pPr marL="2286000" algn="l" defTabSz="914400" rtl="0" eaLnBrk="1" latinLnBrk="0" hangingPunct="1">
+              <a:defRPr sz="1800" kern="1200">
+                <a:solidFill>
+                  <a:schemeClr val="tx1"/>
+                </a:solidFill>
+                <a:latin typeface="+mn-lt"/>
+                <a:ea typeface="+mn-ea"/>
+                <a:cs typeface="+mn-cs"/>
+              </a:defRPr>
+            </a:lvl6pPr>
+            <a:lvl7pPr marL="2743200" algn="l" defTabSz="914400" rtl="0" eaLnBrk="1" latinLnBrk="0" hangingPunct="1">
+              <a:defRPr sz="1800" kern="1200">
+                <a:solidFill>
+                  <a:schemeClr val="tx1"/>
+                </a:solidFill>
+                <a:latin typeface="+mn-lt"/>
+                <a:ea typeface="+mn-ea"/>
+                <a:cs typeface="+mn-cs"/>
+              </a:defRPr>
+            </a:lvl7pPr>
+            <a:lvl8pPr marL="3200400" algn="l" defTabSz="914400" rtl="0" eaLnBrk="1" latinLnBrk="0" hangingPunct="1">
+              <a:defRPr sz="1800" kern="1200">
+                <a:solidFill>
+                  <a:schemeClr val="tx1"/>
+                </a:solidFill>
+                <a:latin typeface="+mn-lt"/>
+                <a:ea typeface="+mn-ea"/>
+                <a:cs typeface="+mn-cs"/>
+              </a:defRPr>
+            </a:lvl8pPr>
+            <a:lvl9pPr marL="3657600" algn="l" defTabSz="914400" rtl="0" eaLnBrk="1" latinLnBrk="0" hangingPunct="1">
+              <a:defRPr sz="1800" kern="1200">
+                <a:solidFill>
+                  <a:schemeClr val="tx1"/>
+                </a:solidFill>
+                <a:latin typeface="+mn-lt"/>
+                <a:ea typeface="+mn-ea"/>
+                <a:cs typeface="+mn-cs"/>
+              </a:defRPr>
+            </a:lvl9pPr>
+          </a:lstStyle>
+          <a:p>
+            <a:r>
+              <a:rPr lang="en-US" sz="1600" dirty="0" smtClean="0">
+                <a:solidFill>
+                  <a:schemeClr val="bg1"/>
+                </a:solidFill>
+                <a:latin typeface="Montserrat SemiBold" panose="00000700000000000000" pitchFamily="2" charset="0"/>
+              </a:rPr>
+              <a:t>2. Command Result Box</a:t>
+            </a:r>
+            <a:endParaRPr lang="en-US" sz="1600" dirty="0">
+              <a:solidFill>
+                <a:schemeClr val="bg1"/>
+              </a:solidFill>
+              <a:latin typeface="Montserrat SemiBold" panose="00000700000000000000" pitchFamily="2" charset="0"/>
+            </a:endParaRPr>
+          </a:p>
+        </p:txBody>
+      </p:sp>
+      <p:sp>
+        <p:nvSpPr>
+          <p:cNvPr id="41" name="Rectangle: Rounded Corners 8">
+            <a:extLst>
+              <a:ext uri="{FF2B5EF4-FFF2-40B4-BE49-F238E27FC236}">
+                <a16:creationId xmlns:a16="http://schemas.microsoft.com/office/drawing/2014/main" id="{B447E29A-1E5C-4328-A4B3-F679E1A80022}"/>
+              </a:ext>
+            </a:extLst>
+          </p:cNvPr>
+          <p:cNvSpPr/>
+          <p:nvPr/>
+        </p:nvSpPr>
+        <p:spPr>
+          <a:xfrm>
+            <a:off x="2700815" y="2260257"/>
+            <a:ext cx="2236946" cy="3988144"/>
+          </a:xfrm>
+          <a:prstGeom prst="roundRect">
+            <a:avLst>
+              <a:gd name="adj" fmla="val 8151"/>
+            </a:avLst>
+          </a:prstGeom>
+          <a:noFill/>
+          <a:ln w="38100">
+            <a:solidFill>
+              <a:srgbClr val="DECE64"/>
+            </a:solidFill>
+          </a:ln>
+        </p:spPr>
+        <p:style>
+          <a:lnRef idx="2">
+            <a:schemeClr val="accent6"/>
+          </a:lnRef>
+          <a:fillRef idx="1">
+            <a:schemeClr val="lt1"/>
+          </a:fillRef>
+          <a:effectRef idx="0">
+            <a:schemeClr val="accent6"/>
+          </a:effectRef>
+          <a:fontRef idx="minor">
+            <a:schemeClr val="dk1"/>
+          </a:fontRef>
+        </p:style>
+        <p:txBody>
+          <a:bodyPr rtlCol="0" anchor="ctr"/>
+          <a:lstStyle>
+            <a:defPPr>
+              <a:defRPr lang="en-US"/>
+            </a:defPPr>
+            <a:lvl1pPr marL="0" algn="l" defTabSz="914400" rtl="0" eaLnBrk="1" latinLnBrk="0" hangingPunct="1">
+              <a:defRPr sz="1800" kern="1200">
+                <a:solidFill>
+                  <a:schemeClr val="dk1"/>
+                </a:solidFill>
+                <a:latin typeface="+mn-lt"/>
+                <a:ea typeface="+mn-ea"/>
+                <a:cs typeface="+mn-cs"/>
+              </a:defRPr>
+            </a:lvl1pPr>
+            <a:lvl2pPr marL="457200" algn="l" defTabSz="914400" rtl="0" eaLnBrk="1" latinLnBrk="0" hangingPunct="1">
+              <a:defRPr sz="1800" kern="1200">
+                <a:solidFill>
+                  <a:schemeClr val="dk1"/>
+                </a:solidFill>
+                <a:latin typeface="+mn-lt"/>
+                <a:ea typeface="+mn-ea"/>
+                <a:cs typeface="+mn-cs"/>
+              </a:defRPr>
+            </a:lvl2pPr>
+            <a:lvl3pPr marL="914400" algn="l" defTabSz="914400" rtl="0" eaLnBrk="1" latinLnBrk="0" hangingPunct="1">
+              <a:defRPr sz="1800" kern="1200">
+                <a:solidFill>
+                  <a:schemeClr val="dk1"/>
+                </a:solidFill>
+                <a:latin typeface="+mn-lt"/>
+                <a:ea typeface="+mn-ea"/>
+                <a:cs typeface="+mn-cs"/>
+              </a:defRPr>
+            </a:lvl3pPr>
+            <a:lvl4pPr marL="1371600" algn="l" defTabSz="914400" rtl="0" eaLnBrk="1" latinLnBrk="0" hangingPunct="1">
+              <a:defRPr sz="1800" kern="1200">
+                <a:solidFill>
+                  <a:schemeClr val="dk1"/>
+                </a:solidFill>
+                <a:latin typeface="+mn-lt"/>
+                <a:ea typeface="+mn-ea"/>
+                <a:cs typeface="+mn-cs"/>
+              </a:defRPr>
+            </a:lvl4pPr>
+            <a:lvl5pPr marL="1828800" algn="l" defTabSz="914400" rtl="0" eaLnBrk="1" latinLnBrk="0" hangingPunct="1">
+              <a:defRPr sz="1800" kern="1200">
+                <a:solidFill>
+                  <a:schemeClr val="dk1"/>
+                </a:solidFill>
+                <a:latin typeface="+mn-lt"/>
+                <a:ea typeface="+mn-ea"/>
+                <a:cs typeface="+mn-cs"/>
+              </a:defRPr>
+            </a:lvl5pPr>
+            <a:lvl6pPr marL="2286000" algn="l" defTabSz="914400" rtl="0" eaLnBrk="1" latinLnBrk="0" hangingPunct="1">
+              <a:defRPr sz="1800" kern="1200">
+                <a:solidFill>
+                  <a:schemeClr val="dk1"/>
+                </a:solidFill>
+                <a:latin typeface="+mn-lt"/>
+                <a:ea typeface="+mn-ea"/>
+                <a:cs typeface="+mn-cs"/>
+              </a:defRPr>
+            </a:lvl6pPr>
+            <a:lvl7pPr marL="2743200" algn="l" defTabSz="914400" rtl="0" eaLnBrk="1" latinLnBrk="0" hangingPunct="1">
+              <a:defRPr sz="1800" kern="1200">
+                <a:solidFill>
+                  <a:schemeClr val="dk1"/>
+                </a:solidFill>
+                <a:latin typeface="+mn-lt"/>
+                <a:ea typeface="+mn-ea"/>
+                <a:cs typeface="+mn-cs"/>
+              </a:defRPr>
+            </a:lvl7pPr>
+            <a:lvl8pPr marL="3200400" algn="l" defTabSz="914400" rtl="0" eaLnBrk="1" latinLnBrk="0" hangingPunct="1">
+              <a:defRPr sz="1800" kern="1200">
+                <a:solidFill>
+                  <a:schemeClr val="dk1"/>
+                </a:solidFill>
+                <a:latin typeface="+mn-lt"/>
+                <a:ea typeface="+mn-ea"/>
+                <a:cs typeface="+mn-cs"/>
+              </a:defRPr>
+            </a:lvl8pPr>
+            <a:lvl9pPr marL="3657600" algn="l" defTabSz="914400" rtl="0" eaLnBrk="1" latinLnBrk="0" hangingPunct="1">
+              <a:defRPr sz="1800" kern="1200">
+                <a:solidFill>
+                  <a:schemeClr val="dk1"/>
+                </a:solidFill>
+                <a:latin typeface="+mn-lt"/>
+                <a:ea typeface="+mn-ea"/>
+                <a:cs typeface="+mn-cs"/>
+              </a:defRPr>
+            </a:lvl9pPr>
+          </a:lstStyle>
+          <a:p>
+            <a:pPr algn="ctr"/>
+            <a:endParaRPr lang="en-US" baseline="-25000" dirty="0"/>
+          </a:p>
+        </p:txBody>
+      </p:sp>
+      <p:cxnSp>
+        <p:nvCxnSpPr>
+          <p:cNvPr id="42" name="Straight Connector 41">
+            <a:extLst>
+              <a:ext uri="{FF2B5EF4-FFF2-40B4-BE49-F238E27FC236}">
+                <a16:creationId xmlns:a16="http://schemas.microsoft.com/office/drawing/2014/main" id="{F3E27EC6-F751-4B53-B8E2-35D54A66CDA6}"/>
+              </a:ext>
+            </a:extLst>
+          </p:cNvPr>
+          <p:cNvCxnSpPr>
+            <a:cxnSpLocks/>
+            <a:stCxn id="41" idx="1"/>
+            <a:endCxn id="43" idx="3"/>
+          </p:cNvCxnSpPr>
+          <p:nvPr/>
+        </p:nvCxnSpPr>
+        <p:spPr>
+          <a:xfrm flipH="1" flipV="1">
+            <a:off x="1704109" y="4254328"/>
+            <a:ext cx="996706" cy="1"/>
+          </a:xfrm>
+          <a:prstGeom prst="line">
+            <a:avLst/>
+          </a:prstGeom>
+          <a:ln w="38100">
+            <a:solidFill>
+              <a:srgbClr val="DECE64"/>
+            </a:solidFill>
+          </a:ln>
+        </p:spPr>
+        <p:style>
+          <a:lnRef idx="1">
+            <a:schemeClr val="accent1"/>
+          </a:lnRef>
+          <a:fillRef idx="0">
+            <a:schemeClr val="accent1"/>
+          </a:fillRef>
+          <a:effectRef idx="0">
+            <a:schemeClr val="accent1"/>
+          </a:effectRef>
+          <a:fontRef idx="minor">
+            <a:schemeClr val="tx1"/>
+          </a:fontRef>
+        </p:style>
+      </p:cxnSp>
+      <p:sp>
+        <p:nvSpPr>
+          <p:cNvPr id="43" name="TextBox 11">
+            <a:extLst>
+              <a:ext uri="{FF2B5EF4-FFF2-40B4-BE49-F238E27FC236}">
+                <a16:creationId xmlns:a16="http://schemas.microsoft.com/office/drawing/2014/main" id="{0DC88B0A-A26D-4C97-8D65-F9EAF98C73E2}"/>
+              </a:ext>
+            </a:extLst>
+          </p:cNvPr>
+          <p:cNvSpPr txBox="1"/>
+          <p:nvPr/>
+        </p:nvSpPr>
+        <p:spPr>
+          <a:xfrm>
+            <a:off x="0" y="3961940"/>
+            <a:ext cx="1704109" cy="584775"/>
+          </a:xfrm>
+          <a:prstGeom prst="rect">
+            <a:avLst/>
+          </a:prstGeom>
+          <a:solidFill>
+            <a:srgbClr val="DECE64"/>
+          </a:solidFill>
+        </p:spPr>
+        <p:txBody>
+          <a:bodyPr wrap="square" rtlCol="0">
+            <a:spAutoFit/>
+          </a:bodyPr>
+          <a:lstStyle>
+            <a:defPPr>
+              <a:defRPr lang="en-US"/>
+            </a:defPPr>
+            <a:lvl1pPr marL="0" algn="l" defTabSz="914400" rtl="0" eaLnBrk="1" latinLnBrk="0" hangingPunct="1">
+              <a:defRPr sz="1800" kern="1200">
+                <a:solidFill>
+                  <a:schemeClr val="tx1"/>
+                </a:solidFill>
+                <a:latin typeface="+mn-lt"/>
+                <a:ea typeface="+mn-ea"/>
+                <a:cs typeface="+mn-cs"/>
+              </a:defRPr>
+            </a:lvl1pPr>
+            <a:lvl2pPr marL="457200" algn="l" defTabSz="914400" rtl="0" eaLnBrk="1" latinLnBrk="0" hangingPunct="1">
+              <a:defRPr sz="1800" kern="1200">
+                <a:solidFill>
+                  <a:schemeClr val="tx1"/>
+                </a:solidFill>
+                <a:latin typeface="+mn-lt"/>
+                <a:ea typeface="+mn-ea"/>
+                <a:cs typeface="+mn-cs"/>
+              </a:defRPr>
+            </a:lvl2pPr>
+            <a:lvl3pPr marL="914400" algn="l" defTabSz="914400" rtl="0" eaLnBrk="1" latinLnBrk="0" hangingPunct="1">
+              <a:defRPr sz="1800" kern="1200">
+                <a:solidFill>
+                  <a:schemeClr val="tx1"/>
+                </a:solidFill>
+                <a:latin typeface="+mn-lt"/>
+                <a:ea typeface="+mn-ea"/>
+                <a:cs typeface="+mn-cs"/>
+              </a:defRPr>
+            </a:lvl3pPr>
+            <a:lvl4pPr marL="1371600" algn="l" defTabSz="914400" rtl="0" eaLnBrk="1" latinLnBrk="0" hangingPunct="1">
+              <a:defRPr sz="1800" kern="1200">
+                <a:solidFill>
+                  <a:schemeClr val="tx1"/>
+                </a:solidFill>
+                <a:latin typeface="+mn-lt"/>
+                <a:ea typeface="+mn-ea"/>
+                <a:cs typeface="+mn-cs"/>
+              </a:defRPr>
+            </a:lvl4pPr>
+            <a:lvl5pPr marL="1828800" algn="l" defTabSz="914400" rtl="0" eaLnBrk="1" latinLnBrk="0" hangingPunct="1">
+              <a:defRPr sz="1800" kern="1200">
+                <a:solidFill>
+                  <a:schemeClr val="tx1"/>
+                </a:solidFill>
+                <a:latin typeface="+mn-lt"/>
+                <a:ea typeface="+mn-ea"/>
+                <a:cs typeface="+mn-cs"/>
+              </a:defRPr>
+            </a:lvl5pPr>
+            <a:lvl6pPr marL="2286000" algn="l" defTabSz="914400" rtl="0" eaLnBrk="1" latinLnBrk="0" hangingPunct="1">
+              <a:defRPr sz="1800" kern="1200">
+                <a:solidFill>
+                  <a:schemeClr val="tx1"/>
+                </a:solidFill>
+                <a:latin typeface="+mn-lt"/>
+                <a:ea typeface="+mn-ea"/>
+                <a:cs typeface="+mn-cs"/>
+              </a:defRPr>
+            </a:lvl6pPr>
+            <a:lvl7pPr marL="2743200" algn="l" defTabSz="914400" rtl="0" eaLnBrk="1" latinLnBrk="0" hangingPunct="1">
+              <a:defRPr sz="1800" kern="1200">
+                <a:solidFill>
+                  <a:schemeClr val="tx1"/>
+                </a:solidFill>
+                <a:latin typeface="+mn-lt"/>
+                <a:ea typeface="+mn-ea"/>
+                <a:cs typeface="+mn-cs"/>
+              </a:defRPr>
+            </a:lvl7pPr>
+            <a:lvl8pPr marL="3200400" algn="l" defTabSz="914400" rtl="0" eaLnBrk="1" latinLnBrk="0" hangingPunct="1">
+              <a:defRPr sz="1800" kern="1200">
+                <a:solidFill>
+                  <a:schemeClr val="tx1"/>
+                </a:solidFill>
+                <a:latin typeface="+mn-lt"/>
+                <a:ea typeface="+mn-ea"/>
+                <a:cs typeface="+mn-cs"/>
+              </a:defRPr>
+            </a:lvl8pPr>
+            <a:lvl9pPr marL="3657600" algn="l" defTabSz="914400" rtl="0" eaLnBrk="1" latinLnBrk="0" hangingPunct="1">
+              <a:defRPr sz="1800" kern="1200">
+                <a:solidFill>
+                  <a:schemeClr val="tx1"/>
+                </a:solidFill>
+                <a:latin typeface="+mn-lt"/>
+                <a:ea typeface="+mn-ea"/>
+                <a:cs typeface="+mn-cs"/>
+              </a:defRPr>
+            </a:lvl9pPr>
+          </a:lstStyle>
+          <a:p>
+            <a:r>
+              <a:rPr lang="en-US" sz="1600" dirty="0" smtClean="0">
+                <a:solidFill>
+                  <a:schemeClr val="bg1"/>
+                </a:solidFill>
+                <a:latin typeface="Montserrat SemiBold" panose="00000700000000000000" pitchFamily="2" charset="0"/>
+              </a:rPr>
+              <a:t>3. Contacts List</a:t>
+            </a:r>
+            <a:endParaRPr lang="en-US" sz="1600" dirty="0">
+              <a:solidFill>
+                <a:schemeClr val="bg1"/>
+              </a:solidFill>
+              <a:latin typeface="Montserrat SemiBold" panose="00000700000000000000" pitchFamily="2" charset="0"/>
+            </a:endParaRPr>
+          </a:p>
+        </p:txBody>
+      </p:sp>
+      <p:sp>
+        <p:nvSpPr>
+          <p:cNvPr id="54" name="Rectangle: Rounded Corners 8">
+            <a:extLst>
+              <a:ext uri="{FF2B5EF4-FFF2-40B4-BE49-F238E27FC236}">
+                <a16:creationId xmlns:a16="http://schemas.microsoft.com/office/drawing/2014/main" id="{B447E29A-1E5C-4328-A4B3-F679E1A80022}"/>
+              </a:ext>
+            </a:extLst>
+          </p:cNvPr>
+          <p:cNvSpPr/>
+          <p:nvPr/>
+        </p:nvSpPr>
+        <p:spPr>
+          <a:xfrm>
+            <a:off x="5202945" y="2260256"/>
+            <a:ext cx="6709655" cy="3988144"/>
+          </a:xfrm>
+          <a:prstGeom prst="roundRect">
+            <a:avLst>
+              <a:gd name="adj" fmla="val 6037"/>
+            </a:avLst>
+          </a:prstGeom>
+          <a:noFill/>
+          <a:ln w="38100">
+            <a:solidFill>
+              <a:srgbClr val="DECE64"/>
+            </a:solidFill>
+          </a:ln>
+        </p:spPr>
+        <p:style>
+          <a:lnRef idx="2">
+            <a:schemeClr val="accent6"/>
+          </a:lnRef>
+          <a:fillRef idx="1">
+            <a:schemeClr val="lt1"/>
+          </a:fillRef>
+          <a:effectRef idx="0">
+            <a:schemeClr val="accent6"/>
+          </a:effectRef>
+          <a:fontRef idx="minor">
+            <a:schemeClr val="dk1"/>
+          </a:fontRef>
+        </p:style>
+        <p:txBody>
+          <a:bodyPr rtlCol="0" anchor="ctr"/>
+          <a:lstStyle>
+            <a:defPPr>
+              <a:defRPr lang="en-US"/>
+            </a:defPPr>
+            <a:lvl1pPr marL="0" algn="l" defTabSz="914400" rtl="0" eaLnBrk="1" latinLnBrk="0" hangingPunct="1">
+              <a:defRPr sz="1800" kern="1200">
+                <a:solidFill>
+                  <a:schemeClr val="dk1"/>
+                </a:solidFill>
+                <a:latin typeface="+mn-lt"/>
+                <a:ea typeface="+mn-ea"/>
+                <a:cs typeface="+mn-cs"/>
+              </a:defRPr>
+            </a:lvl1pPr>
+            <a:lvl2pPr marL="457200" algn="l" defTabSz="914400" rtl="0" eaLnBrk="1" latinLnBrk="0" hangingPunct="1">
+              <a:defRPr sz="1800" kern="1200">
+                <a:solidFill>
+                  <a:schemeClr val="dk1"/>
+                </a:solidFill>
+                <a:latin typeface="+mn-lt"/>
+                <a:ea typeface="+mn-ea"/>
+                <a:cs typeface="+mn-cs"/>
+              </a:defRPr>
+            </a:lvl2pPr>
+            <a:lvl3pPr marL="914400" algn="l" defTabSz="914400" rtl="0" eaLnBrk="1" latinLnBrk="0" hangingPunct="1">
+              <a:defRPr sz="1800" kern="1200">
+                <a:solidFill>
+                  <a:schemeClr val="dk1"/>
+                </a:solidFill>
+                <a:latin typeface="+mn-lt"/>
+                <a:ea typeface="+mn-ea"/>
+                <a:cs typeface="+mn-cs"/>
+              </a:defRPr>
+            </a:lvl3pPr>
+            <a:lvl4pPr marL="1371600" algn="l" defTabSz="914400" rtl="0" eaLnBrk="1" latinLnBrk="0" hangingPunct="1">
+              <a:defRPr sz="1800" kern="1200">
+                <a:solidFill>
+                  <a:schemeClr val="dk1"/>
+                </a:solidFill>
+                <a:latin typeface="+mn-lt"/>
+                <a:ea typeface="+mn-ea"/>
+                <a:cs typeface="+mn-cs"/>
+              </a:defRPr>
+            </a:lvl4pPr>
+            <a:lvl5pPr marL="1828800" algn="l" defTabSz="914400" rtl="0" eaLnBrk="1" latinLnBrk="0" hangingPunct="1">
+              <a:defRPr sz="1800" kern="1200">
+                <a:solidFill>
+                  <a:schemeClr val="dk1"/>
+                </a:solidFill>
+                <a:latin typeface="+mn-lt"/>
+                <a:ea typeface="+mn-ea"/>
+                <a:cs typeface="+mn-cs"/>
+              </a:defRPr>
+            </a:lvl5pPr>
+            <a:lvl6pPr marL="2286000" algn="l" defTabSz="914400" rtl="0" eaLnBrk="1" latinLnBrk="0" hangingPunct="1">
+              <a:defRPr sz="1800" kern="1200">
+                <a:solidFill>
+                  <a:schemeClr val="dk1"/>
+                </a:solidFill>
+                <a:latin typeface="+mn-lt"/>
+                <a:ea typeface="+mn-ea"/>
+                <a:cs typeface="+mn-cs"/>
+              </a:defRPr>
+            </a:lvl6pPr>
+            <a:lvl7pPr marL="2743200" algn="l" defTabSz="914400" rtl="0" eaLnBrk="1" latinLnBrk="0" hangingPunct="1">
+              <a:defRPr sz="1800" kern="1200">
+                <a:solidFill>
+                  <a:schemeClr val="dk1"/>
+                </a:solidFill>
+                <a:latin typeface="+mn-lt"/>
+                <a:ea typeface="+mn-ea"/>
+                <a:cs typeface="+mn-cs"/>
+              </a:defRPr>
+            </a:lvl7pPr>
+            <a:lvl8pPr marL="3200400" algn="l" defTabSz="914400" rtl="0" eaLnBrk="1" latinLnBrk="0" hangingPunct="1">
+              <a:defRPr sz="1800" kern="1200">
+                <a:solidFill>
+                  <a:schemeClr val="dk1"/>
+                </a:solidFill>
+                <a:latin typeface="+mn-lt"/>
+                <a:ea typeface="+mn-ea"/>
+                <a:cs typeface="+mn-cs"/>
+              </a:defRPr>
+            </a:lvl8pPr>
+            <a:lvl9pPr marL="3657600" algn="l" defTabSz="914400" rtl="0" eaLnBrk="1" latinLnBrk="0" hangingPunct="1">
+              <a:defRPr sz="1800" kern="1200">
+                <a:solidFill>
+                  <a:schemeClr val="dk1"/>
+                </a:solidFill>
+                <a:latin typeface="+mn-lt"/>
+                <a:ea typeface="+mn-ea"/>
+                <a:cs typeface="+mn-cs"/>
+              </a:defRPr>
+            </a:lvl9pPr>
+          </a:lstStyle>
+          <a:p>
+            <a:pPr algn="ctr"/>
+            <a:endParaRPr lang="en-US" baseline="-25000" dirty="0"/>
+          </a:p>
+        </p:txBody>
+      </p:sp>
+      <p:cxnSp>
+        <p:nvCxnSpPr>
+          <p:cNvPr id="55" name="Straight Connector 54">
+            <a:extLst>
+              <a:ext uri="{FF2B5EF4-FFF2-40B4-BE49-F238E27FC236}">
+                <a16:creationId xmlns:a16="http://schemas.microsoft.com/office/drawing/2014/main" id="{F3E27EC6-F751-4B53-B8E2-35D54A66CDA6}"/>
+              </a:ext>
+            </a:extLst>
+          </p:cNvPr>
+          <p:cNvCxnSpPr>
+            <a:cxnSpLocks/>
+            <a:stCxn id="54" idx="3"/>
+            <a:endCxn id="56" idx="3"/>
+          </p:cNvCxnSpPr>
+          <p:nvPr/>
+        </p:nvCxnSpPr>
+        <p:spPr>
+          <a:xfrm>
+            <a:off x="11912600" y="4254328"/>
+            <a:ext cx="2574925" cy="0"/>
+          </a:xfrm>
+          <a:prstGeom prst="line">
+            <a:avLst/>
+          </a:prstGeom>
+          <a:ln w="38100">
+            <a:solidFill>
+              <a:srgbClr val="DECE64"/>
+            </a:solidFill>
+          </a:ln>
+        </p:spPr>
+        <p:style>
+          <a:lnRef idx="1">
+            <a:schemeClr val="accent1"/>
+          </a:lnRef>
+          <a:fillRef idx="0">
+            <a:schemeClr val="accent1"/>
+          </a:fillRef>
+          <a:effectRef idx="0">
+            <a:schemeClr val="accent1"/>
+          </a:effectRef>
+          <a:fontRef idx="minor">
+            <a:schemeClr val="tx1"/>
+          </a:fontRef>
+        </p:style>
+      </p:cxnSp>
+      <p:sp>
+        <p:nvSpPr>
+          <p:cNvPr id="56" name="TextBox 11">
+            <a:extLst>
+              <a:ext uri="{FF2B5EF4-FFF2-40B4-BE49-F238E27FC236}">
+                <a16:creationId xmlns:a16="http://schemas.microsoft.com/office/drawing/2014/main" id="{0DC88B0A-A26D-4C97-8D65-F9EAF98C73E2}"/>
+              </a:ext>
+            </a:extLst>
+          </p:cNvPr>
+          <p:cNvSpPr txBox="1"/>
+          <p:nvPr/>
+        </p:nvSpPr>
+        <p:spPr>
+          <a:xfrm>
+            <a:off x="12947634" y="4085051"/>
+            <a:ext cx="1539891" cy="338554"/>
+          </a:xfrm>
+          <a:prstGeom prst="rect">
+            <a:avLst/>
+          </a:prstGeom>
+          <a:solidFill>
+            <a:srgbClr val="DECE64"/>
+          </a:solidFill>
+        </p:spPr>
+        <p:txBody>
+          <a:bodyPr wrap="square" rtlCol="0">
+            <a:spAutoFit/>
+          </a:bodyPr>
+          <a:lstStyle>
+            <a:defPPr>
+              <a:defRPr lang="en-US"/>
+            </a:defPPr>
+            <a:lvl1pPr marL="0" algn="l" defTabSz="914400" rtl="0" eaLnBrk="1" latinLnBrk="0" hangingPunct="1">
+              <a:defRPr sz="1800" kern="1200">
+                <a:solidFill>
+                  <a:schemeClr val="tx1"/>
+                </a:solidFill>
+                <a:latin typeface="+mn-lt"/>
+                <a:ea typeface="+mn-ea"/>
+                <a:cs typeface="+mn-cs"/>
+              </a:defRPr>
+            </a:lvl1pPr>
+            <a:lvl2pPr marL="457200" algn="l" defTabSz="914400" rtl="0" eaLnBrk="1" latinLnBrk="0" hangingPunct="1">
+              <a:defRPr sz="1800" kern="1200">
+                <a:solidFill>
+                  <a:schemeClr val="tx1"/>
+                </a:solidFill>
+                <a:latin typeface="+mn-lt"/>
+                <a:ea typeface="+mn-ea"/>
+                <a:cs typeface="+mn-cs"/>
+              </a:defRPr>
+            </a:lvl2pPr>
+            <a:lvl3pPr marL="914400" algn="l" defTabSz="914400" rtl="0" eaLnBrk="1" latinLnBrk="0" hangingPunct="1">
+              <a:defRPr sz="1800" kern="1200">
+                <a:solidFill>
+                  <a:schemeClr val="tx1"/>
+                </a:solidFill>
+                <a:latin typeface="+mn-lt"/>
+                <a:ea typeface="+mn-ea"/>
+                <a:cs typeface="+mn-cs"/>
+              </a:defRPr>
+            </a:lvl3pPr>
+            <a:lvl4pPr marL="1371600" algn="l" defTabSz="914400" rtl="0" eaLnBrk="1" latinLnBrk="0" hangingPunct="1">
+              <a:defRPr sz="1800" kern="1200">
+                <a:solidFill>
+                  <a:schemeClr val="tx1"/>
+                </a:solidFill>
+                <a:latin typeface="+mn-lt"/>
+                <a:ea typeface="+mn-ea"/>
+                <a:cs typeface="+mn-cs"/>
+              </a:defRPr>
+            </a:lvl4pPr>
+            <a:lvl5pPr marL="1828800" algn="l" defTabSz="914400" rtl="0" eaLnBrk="1" latinLnBrk="0" hangingPunct="1">
+              <a:defRPr sz="1800" kern="1200">
+                <a:solidFill>
+                  <a:schemeClr val="tx1"/>
+                </a:solidFill>
+                <a:latin typeface="+mn-lt"/>
+                <a:ea typeface="+mn-ea"/>
+                <a:cs typeface="+mn-cs"/>
+              </a:defRPr>
+            </a:lvl5pPr>
+            <a:lvl6pPr marL="2286000" algn="l" defTabSz="914400" rtl="0" eaLnBrk="1" latinLnBrk="0" hangingPunct="1">
+              <a:defRPr sz="1800" kern="1200">
+                <a:solidFill>
+                  <a:schemeClr val="tx1"/>
+                </a:solidFill>
+                <a:latin typeface="+mn-lt"/>
+                <a:ea typeface="+mn-ea"/>
+                <a:cs typeface="+mn-cs"/>
+              </a:defRPr>
+            </a:lvl6pPr>
+            <a:lvl7pPr marL="2743200" algn="l" defTabSz="914400" rtl="0" eaLnBrk="1" latinLnBrk="0" hangingPunct="1">
+              <a:defRPr sz="1800" kern="1200">
+                <a:solidFill>
+                  <a:schemeClr val="tx1"/>
+                </a:solidFill>
+                <a:latin typeface="+mn-lt"/>
+                <a:ea typeface="+mn-ea"/>
+                <a:cs typeface="+mn-cs"/>
+              </a:defRPr>
+            </a:lvl7pPr>
+            <a:lvl8pPr marL="3200400" algn="l" defTabSz="914400" rtl="0" eaLnBrk="1" latinLnBrk="0" hangingPunct="1">
+              <a:defRPr sz="1800" kern="1200">
+                <a:solidFill>
+                  <a:schemeClr val="tx1"/>
+                </a:solidFill>
+                <a:latin typeface="+mn-lt"/>
+                <a:ea typeface="+mn-ea"/>
+                <a:cs typeface="+mn-cs"/>
+              </a:defRPr>
+            </a:lvl8pPr>
+            <a:lvl9pPr marL="3657600" algn="l" defTabSz="914400" rtl="0" eaLnBrk="1" latinLnBrk="0" hangingPunct="1">
+              <a:defRPr sz="1800" kern="1200">
+                <a:solidFill>
+                  <a:schemeClr val="tx1"/>
+                </a:solidFill>
+                <a:latin typeface="+mn-lt"/>
+                <a:ea typeface="+mn-ea"/>
+                <a:cs typeface="+mn-cs"/>
+              </a:defRPr>
+            </a:lvl9pPr>
+          </a:lstStyle>
+          <a:p>
+            <a:r>
+              <a:rPr lang="en-US" sz="1600" dirty="0" smtClean="0">
+                <a:solidFill>
+                  <a:schemeClr val="bg1"/>
+                </a:solidFill>
+                <a:latin typeface="Montserrat SemiBold" panose="00000700000000000000" pitchFamily="2" charset="0"/>
+              </a:rPr>
+              <a:t>4. </a:t>
+            </a:r>
+            <a:r>
+              <a:rPr lang="en-US" sz="1600" dirty="0" err="1" smtClean="0">
+                <a:solidFill>
+                  <a:schemeClr val="bg1"/>
+                </a:solidFill>
+                <a:latin typeface="Montserrat SemiBold" panose="00000700000000000000" pitchFamily="2" charset="0"/>
+              </a:rPr>
+              <a:t>Infopanel</a:t>
+            </a:r>
+            <a:endParaRPr lang="en-US" sz="1600" dirty="0">
+              <a:solidFill>
+                <a:schemeClr val="bg1"/>
+              </a:solidFill>
+              <a:latin typeface="Montserrat SemiBold" panose="00000700000000000000" pitchFamily="2" charset="0"/>
+            </a:endParaRPr>
+          </a:p>
+        </p:txBody>
+      </p:sp>
+      <p:sp>
+        <p:nvSpPr>
+          <p:cNvPr id="69" name="Rectangle: Rounded Corners 8">
+            <a:extLst>
+              <a:ext uri="{FF2B5EF4-FFF2-40B4-BE49-F238E27FC236}">
+                <a16:creationId xmlns:a16="http://schemas.microsoft.com/office/drawing/2014/main" id="{B447E29A-1E5C-4328-A4B3-F679E1A80022}"/>
+              </a:ext>
+            </a:extLst>
+          </p:cNvPr>
+          <p:cNvSpPr/>
+          <p:nvPr/>
+        </p:nvSpPr>
+        <p:spPr>
+          <a:xfrm>
+            <a:off x="2517524" y="6273486"/>
+            <a:ext cx="9599661" cy="288382"/>
+          </a:xfrm>
+          <a:prstGeom prst="roundRect">
+            <a:avLst>
+              <a:gd name="adj" fmla="val 8151"/>
+            </a:avLst>
+          </a:prstGeom>
+          <a:noFill/>
+          <a:ln w="38100">
+            <a:solidFill>
+              <a:srgbClr val="DECE64"/>
+            </a:solidFill>
+          </a:ln>
+        </p:spPr>
+        <p:style>
+          <a:lnRef idx="2">
+            <a:schemeClr val="accent6"/>
+          </a:lnRef>
+          <a:fillRef idx="1">
+            <a:schemeClr val="lt1"/>
+          </a:fillRef>
+          <a:effectRef idx="0">
+            <a:schemeClr val="accent6"/>
+          </a:effectRef>
+          <a:fontRef idx="minor">
+            <a:schemeClr val="dk1"/>
+          </a:fontRef>
+        </p:style>
+        <p:txBody>
+          <a:bodyPr rtlCol="0" anchor="ctr"/>
+          <a:lstStyle>
+            <a:defPPr>
+              <a:defRPr lang="en-US"/>
+            </a:defPPr>
+            <a:lvl1pPr marL="0" algn="l" defTabSz="914400" rtl="0" eaLnBrk="1" latinLnBrk="0" hangingPunct="1">
+              <a:defRPr sz="1800" kern="1200">
+                <a:solidFill>
+                  <a:schemeClr val="dk1"/>
+                </a:solidFill>
+                <a:latin typeface="+mn-lt"/>
+                <a:ea typeface="+mn-ea"/>
+                <a:cs typeface="+mn-cs"/>
+              </a:defRPr>
+            </a:lvl1pPr>
+            <a:lvl2pPr marL="457200" algn="l" defTabSz="914400" rtl="0" eaLnBrk="1" latinLnBrk="0" hangingPunct="1">
+              <a:defRPr sz="1800" kern="1200">
+                <a:solidFill>
+                  <a:schemeClr val="dk1"/>
+                </a:solidFill>
+                <a:latin typeface="+mn-lt"/>
+                <a:ea typeface="+mn-ea"/>
+                <a:cs typeface="+mn-cs"/>
+              </a:defRPr>
+            </a:lvl2pPr>
+            <a:lvl3pPr marL="914400" algn="l" defTabSz="914400" rtl="0" eaLnBrk="1" latinLnBrk="0" hangingPunct="1">
+              <a:defRPr sz="1800" kern="1200">
+                <a:solidFill>
+                  <a:schemeClr val="dk1"/>
+                </a:solidFill>
+                <a:latin typeface="+mn-lt"/>
+                <a:ea typeface="+mn-ea"/>
+                <a:cs typeface="+mn-cs"/>
+              </a:defRPr>
+            </a:lvl3pPr>
+            <a:lvl4pPr marL="1371600" algn="l" defTabSz="914400" rtl="0" eaLnBrk="1" latinLnBrk="0" hangingPunct="1">
+              <a:defRPr sz="1800" kern="1200">
+                <a:solidFill>
+                  <a:schemeClr val="dk1"/>
+                </a:solidFill>
+                <a:latin typeface="+mn-lt"/>
+                <a:ea typeface="+mn-ea"/>
+                <a:cs typeface="+mn-cs"/>
+              </a:defRPr>
+            </a:lvl4pPr>
+            <a:lvl5pPr marL="1828800" algn="l" defTabSz="914400" rtl="0" eaLnBrk="1" latinLnBrk="0" hangingPunct="1">
+              <a:defRPr sz="1800" kern="1200">
+                <a:solidFill>
+                  <a:schemeClr val="dk1"/>
+                </a:solidFill>
+                <a:latin typeface="+mn-lt"/>
+                <a:ea typeface="+mn-ea"/>
+                <a:cs typeface="+mn-cs"/>
+              </a:defRPr>
+            </a:lvl5pPr>
+            <a:lvl6pPr marL="2286000" algn="l" defTabSz="914400" rtl="0" eaLnBrk="1" latinLnBrk="0" hangingPunct="1">
+              <a:defRPr sz="1800" kern="1200">
+                <a:solidFill>
+                  <a:schemeClr val="dk1"/>
+                </a:solidFill>
+                <a:latin typeface="+mn-lt"/>
+                <a:ea typeface="+mn-ea"/>
+                <a:cs typeface="+mn-cs"/>
+              </a:defRPr>
+            </a:lvl6pPr>
+            <a:lvl7pPr marL="2743200" algn="l" defTabSz="914400" rtl="0" eaLnBrk="1" latinLnBrk="0" hangingPunct="1">
+              <a:defRPr sz="1800" kern="1200">
+                <a:solidFill>
+                  <a:schemeClr val="dk1"/>
+                </a:solidFill>
+                <a:latin typeface="+mn-lt"/>
+                <a:ea typeface="+mn-ea"/>
+                <a:cs typeface="+mn-cs"/>
+              </a:defRPr>
+            </a:lvl7pPr>
+            <a:lvl8pPr marL="3200400" algn="l" defTabSz="914400" rtl="0" eaLnBrk="1" latinLnBrk="0" hangingPunct="1">
+              <a:defRPr sz="1800" kern="1200">
+                <a:solidFill>
+                  <a:schemeClr val="dk1"/>
+                </a:solidFill>
+                <a:latin typeface="+mn-lt"/>
+                <a:ea typeface="+mn-ea"/>
+                <a:cs typeface="+mn-cs"/>
+              </a:defRPr>
+            </a:lvl8pPr>
+            <a:lvl9pPr marL="3657600" algn="l" defTabSz="914400" rtl="0" eaLnBrk="1" latinLnBrk="0" hangingPunct="1">
+              <a:defRPr sz="1800" kern="1200">
+                <a:solidFill>
+                  <a:schemeClr val="dk1"/>
+                </a:solidFill>
+                <a:latin typeface="+mn-lt"/>
+                <a:ea typeface="+mn-ea"/>
+                <a:cs typeface="+mn-cs"/>
+              </a:defRPr>
+            </a:lvl9pPr>
+          </a:lstStyle>
+          <a:p>
+            <a:pPr algn="ctr"/>
+            <a:endParaRPr lang="en-US" baseline="-25000" dirty="0"/>
+          </a:p>
+        </p:txBody>
+      </p:sp>
+      <p:cxnSp>
+        <p:nvCxnSpPr>
+          <p:cNvPr id="70" name="Straight Connector 69">
+            <a:extLst>
+              <a:ext uri="{FF2B5EF4-FFF2-40B4-BE49-F238E27FC236}">
+                <a16:creationId xmlns:a16="http://schemas.microsoft.com/office/drawing/2014/main" id="{F3E27EC6-F751-4B53-B8E2-35D54A66CDA6}"/>
+              </a:ext>
+            </a:extLst>
+          </p:cNvPr>
+          <p:cNvCxnSpPr>
+            <a:cxnSpLocks/>
+            <a:stCxn id="69" idx="1"/>
+            <a:endCxn id="71" idx="3"/>
+          </p:cNvCxnSpPr>
+          <p:nvPr/>
+        </p:nvCxnSpPr>
+        <p:spPr>
+          <a:xfrm flipH="1" flipV="1">
+            <a:off x="1704110" y="6407436"/>
+            <a:ext cx="813414" cy="10241"/>
+          </a:xfrm>
+          <a:prstGeom prst="line">
+            <a:avLst/>
+          </a:prstGeom>
+          <a:ln w="38100">
+            <a:solidFill>
+              <a:srgbClr val="DECE64"/>
+            </a:solidFill>
+          </a:ln>
+        </p:spPr>
+        <p:style>
+          <a:lnRef idx="1">
+            <a:schemeClr val="accent1"/>
+          </a:lnRef>
+          <a:fillRef idx="0">
+            <a:schemeClr val="accent1"/>
+          </a:fillRef>
+          <a:effectRef idx="0">
+            <a:schemeClr val="accent1"/>
+          </a:effectRef>
+          <a:fontRef idx="minor">
+            <a:schemeClr val="tx1"/>
+          </a:fontRef>
+        </p:style>
+      </p:cxnSp>
+      <p:sp>
+        <p:nvSpPr>
+          <p:cNvPr id="71" name="TextBox 11">
+            <a:extLst>
+              <a:ext uri="{FF2B5EF4-FFF2-40B4-BE49-F238E27FC236}">
+                <a16:creationId xmlns:a16="http://schemas.microsoft.com/office/drawing/2014/main" id="{0DC88B0A-A26D-4C97-8D65-F9EAF98C73E2}"/>
+              </a:ext>
+            </a:extLst>
+          </p:cNvPr>
+          <p:cNvSpPr txBox="1"/>
+          <p:nvPr/>
+        </p:nvSpPr>
+        <p:spPr>
+          <a:xfrm>
+            <a:off x="-17034" y="6238159"/>
+            <a:ext cx="1721144" cy="338554"/>
+          </a:xfrm>
+          <a:prstGeom prst="rect">
+            <a:avLst/>
+          </a:prstGeom>
+          <a:solidFill>
+            <a:srgbClr val="DECE64"/>
+          </a:solidFill>
+        </p:spPr>
+        <p:txBody>
+          <a:bodyPr wrap="square" rtlCol="0">
+            <a:spAutoFit/>
+          </a:bodyPr>
+          <a:lstStyle>
+            <a:defPPr>
+              <a:defRPr lang="en-US"/>
+            </a:defPPr>
+            <a:lvl1pPr marL="0" algn="l" defTabSz="914400" rtl="0" eaLnBrk="1" latinLnBrk="0" hangingPunct="1">
+              <a:defRPr sz="1800" kern="1200">
+                <a:solidFill>
+                  <a:schemeClr val="tx1"/>
+                </a:solidFill>
+                <a:latin typeface="+mn-lt"/>
+                <a:ea typeface="+mn-ea"/>
+                <a:cs typeface="+mn-cs"/>
+              </a:defRPr>
+            </a:lvl1pPr>
+            <a:lvl2pPr marL="457200" algn="l" defTabSz="914400" rtl="0" eaLnBrk="1" latinLnBrk="0" hangingPunct="1">
+              <a:defRPr sz="1800" kern="1200">
+                <a:solidFill>
+                  <a:schemeClr val="tx1"/>
+                </a:solidFill>
+                <a:latin typeface="+mn-lt"/>
+                <a:ea typeface="+mn-ea"/>
+                <a:cs typeface="+mn-cs"/>
+              </a:defRPr>
+            </a:lvl2pPr>
+            <a:lvl3pPr marL="914400" algn="l" defTabSz="914400" rtl="0" eaLnBrk="1" latinLnBrk="0" hangingPunct="1">
+              <a:defRPr sz="1800" kern="1200">
+                <a:solidFill>
+                  <a:schemeClr val="tx1"/>
+                </a:solidFill>
+                <a:latin typeface="+mn-lt"/>
+                <a:ea typeface="+mn-ea"/>
+                <a:cs typeface="+mn-cs"/>
+              </a:defRPr>
+            </a:lvl3pPr>
+            <a:lvl4pPr marL="1371600" algn="l" defTabSz="914400" rtl="0" eaLnBrk="1" latinLnBrk="0" hangingPunct="1">
+              <a:defRPr sz="1800" kern="1200">
+                <a:solidFill>
+                  <a:schemeClr val="tx1"/>
+                </a:solidFill>
+                <a:latin typeface="+mn-lt"/>
+                <a:ea typeface="+mn-ea"/>
+                <a:cs typeface="+mn-cs"/>
+              </a:defRPr>
+            </a:lvl4pPr>
+            <a:lvl5pPr marL="1828800" algn="l" defTabSz="914400" rtl="0" eaLnBrk="1" latinLnBrk="0" hangingPunct="1">
+              <a:defRPr sz="1800" kern="1200">
+                <a:solidFill>
+                  <a:schemeClr val="tx1"/>
+                </a:solidFill>
+                <a:latin typeface="+mn-lt"/>
+                <a:ea typeface="+mn-ea"/>
+                <a:cs typeface="+mn-cs"/>
+              </a:defRPr>
+            </a:lvl5pPr>
+            <a:lvl6pPr marL="2286000" algn="l" defTabSz="914400" rtl="0" eaLnBrk="1" latinLnBrk="0" hangingPunct="1">
+              <a:defRPr sz="1800" kern="1200">
+                <a:solidFill>
+                  <a:schemeClr val="tx1"/>
+                </a:solidFill>
+                <a:latin typeface="+mn-lt"/>
+                <a:ea typeface="+mn-ea"/>
+                <a:cs typeface="+mn-cs"/>
+              </a:defRPr>
+            </a:lvl6pPr>
+            <a:lvl7pPr marL="2743200" algn="l" defTabSz="914400" rtl="0" eaLnBrk="1" latinLnBrk="0" hangingPunct="1">
+              <a:defRPr sz="1800" kern="1200">
+                <a:solidFill>
+                  <a:schemeClr val="tx1"/>
+                </a:solidFill>
+                <a:latin typeface="+mn-lt"/>
+                <a:ea typeface="+mn-ea"/>
+                <a:cs typeface="+mn-cs"/>
+              </a:defRPr>
+            </a:lvl7pPr>
+            <a:lvl8pPr marL="3200400" algn="l" defTabSz="914400" rtl="0" eaLnBrk="1" latinLnBrk="0" hangingPunct="1">
+              <a:defRPr sz="1800" kern="1200">
+                <a:solidFill>
+                  <a:schemeClr val="tx1"/>
+                </a:solidFill>
+                <a:latin typeface="+mn-lt"/>
+                <a:ea typeface="+mn-ea"/>
+                <a:cs typeface="+mn-cs"/>
+              </a:defRPr>
+            </a:lvl8pPr>
+            <a:lvl9pPr marL="3657600" algn="l" defTabSz="914400" rtl="0" eaLnBrk="1" latinLnBrk="0" hangingPunct="1">
+              <a:defRPr sz="1800" kern="1200">
+                <a:solidFill>
+                  <a:schemeClr val="tx1"/>
+                </a:solidFill>
+                <a:latin typeface="+mn-lt"/>
+                <a:ea typeface="+mn-ea"/>
+                <a:cs typeface="+mn-cs"/>
+              </a:defRPr>
+            </a:lvl9pPr>
+          </a:lstStyle>
+          <a:p>
+            <a:r>
+              <a:rPr lang="en-US" sz="1600" dirty="0">
+                <a:solidFill>
+                  <a:schemeClr val="bg1"/>
+                </a:solidFill>
+                <a:latin typeface="Montserrat SemiBold" panose="00000700000000000000" pitchFamily="2" charset="0"/>
+              </a:rPr>
+              <a:t>5</a:t>
+            </a:r>
+            <a:r>
+              <a:rPr lang="en-US" sz="1600" dirty="0" smtClean="0">
+                <a:solidFill>
+                  <a:schemeClr val="bg1"/>
+                </a:solidFill>
+                <a:latin typeface="Montserrat SemiBold" panose="00000700000000000000" pitchFamily="2" charset="0"/>
+              </a:rPr>
+              <a:t>. Status Bar</a:t>
+            </a:r>
+            <a:endParaRPr lang="en-US" sz="1600" dirty="0">
+              <a:solidFill>
+                <a:schemeClr val="bg1"/>
+              </a:solidFill>
+              <a:latin typeface="Montserrat SemiBold" panose="00000700000000000000" pitchFamily="2" charset="0"/>
+            </a:endParaRPr>
+          </a:p>
+        </p:txBody>
+      </p:sp>
+    </p:spTree>
+    <p:extLst>
+      <p:ext uri="{BB962C8B-B14F-4D97-AF65-F5344CB8AC3E}">
+        <p14:creationId xmlns:p14="http://schemas.microsoft.com/office/powerpoint/2010/main" val="388685229"/>
+      </p:ext>
+    </p:extLst>
+  </p:cSld>
+  <p:clrMapOvr>
+    <a:masterClrMapping/>
+  </p:clrMapOvr>
+</p:sld>
+</file>
+
+<file path=ppt/slides/slide3.xml><?xml version="1.0" encoding="utf-8"?>
+<p:sld xmlns:a="http://schemas.openxmlformats.org/drawingml/2006/main" xmlns:r="http://schemas.openxmlformats.org/officeDocument/2006/relationships" xmlns:p="http://schemas.openxmlformats.org/presentationml/2006/main">
+  <p:cSld>
+    <p:spTree>
+      <p:nvGrpSpPr>
+        <p:cNvPr id="1" name=""/>
+        <p:cNvGrpSpPr/>
+        <p:nvPr/>
+      </p:nvGrpSpPr>
+      <p:grpSpPr>
+        <a:xfrm>
+          <a:off x="0" y="0"/>
+          <a:ext cx="0" cy="0"/>
+          <a:chOff x="0" y="0"/>
+          <a:chExt cx="0" cy="0"/>
+        </a:xfrm>
+      </p:grpSpPr>
+      <p:pic>
+        <p:nvPicPr>
+          <p:cNvPr id="4" name="Picture 3"/>
+          <p:cNvPicPr>
+            <a:picLocks noChangeAspect="1"/>
+          </p:cNvPicPr>
+          <p:nvPr/>
+        </p:nvPicPr>
+        <p:blipFill>
+          <a:blip r:embed="rId2"/>
+          <a:stretch>
+            <a:fillRect/>
+          </a:stretch>
+        </p:blipFill>
+        <p:spPr>
+          <a:xfrm>
+            <a:off x="3686175" y="1404937"/>
+            <a:ext cx="4667250" cy="923925"/>
+          </a:xfrm>
+          <a:prstGeom prst="rect">
+            <a:avLst/>
+          </a:prstGeom>
+        </p:spPr>
+      </p:pic>
+      <p:pic>
+        <p:nvPicPr>
+          <p:cNvPr id="5" name="Picture 4"/>
+          <p:cNvPicPr>
+            <a:picLocks noChangeAspect="1"/>
+          </p:cNvPicPr>
+          <p:nvPr/>
+        </p:nvPicPr>
+        <p:blipFill>
+          <a:blip r:embed="rId3"/>
+          <a:stretch>
+            <a:fillRect/>
+          </a:stretch>
+        </p:blipFill>
+        <p:spPr>
+          <a:xfrm>
+            <a:off x="4094162" y="3556000"/>
+            <a:ext cx="4011979" cy="636587"/>
+          </a:xfrm>
+          <a:prstGeom prst="rect">
+            <a:avLst/>
+          </a:prstGeom>
+        </p:spPr>
+      </p:pic>
+    </p:spTree>
+    <p:extLst>
+      <p:ext uri="{BB962C8B-B14F-4D97-AF65-F5344CB8AC3E}">
+        <p14:creationId xmlns:p14="http://schemas.microsoft.com/office/powerpoint/2010/main" val="764440569"/>
+      </p:ext>
+    </p:extLst>
+  </p:cSld>
+  <p:clrMapOvr>
+    <a:masterClrMapping/>
+  </p:clrMapOvr>
+</p:sld>
+</file>
+
 <file path=ppt/theme/theme1.xml><?xml version="1.0" encoding="utf-8"?>
 <a:theme xmlns:a="http://schemas.openxmlformats.org/drawingml/2006/main" name="Office Theme">
   <a:themeElements>

</xml_diff>